<commit_message>
Back up before redoing STN
</commit_message>
<xml_diff>
--- a/Assignment1_STN.pptx
+++ b/Assignment1_STN.pptx
@@ -7,6 +7,7 @@
   <p:sldIdLst>
     <p:sldId id="256" r:id="rId2"/>
     <p:sldId id="257" r:id="rId3"/>
+    <p:sldId id="258" r:id="rId4"/>
   </p:sldIdLst>
   <p:sldSz cx="12192000" cy="6858000"/>
   <p:notesSz cx="6858000" cy="9144000"/>
@@ -244,7 +245,7 @@
           <a:p>
             <a:fld id="{E5B94112-40F8-46F1-9938-B2754288A1D5}" type="datetimeFigureOut">
               <a:rPr lang="en-NZ" smtClean="0"/>
-              <a:t>20/03/2017</a:t>
+              <a:t>23/03/2017</a:t>
             </a:fld>
             <a:endParaRPr lang="en-NZ"/>
           </a:p>
@@ -414,7 +415,7 @@
           <a:p>
             <a:fld id="{E5B94112-40F8-46F1-9938-B2754288A1D5}" type="datetimeFigureOut">
               <a:rPr lang="en-NZ" smtClean="0"/>
-              <a:t>20/03/2017</a:t>
+              <a:t>23/03/2017</a:t>
             </a:fld>
             <a:endParaRPr lang="en-NZ"/>
           </a:p>
@@ -594,7 +595,7 @@
           <a:p>
             <a:fld id="{E5B94112-40F8-46F1-9938-B2754288A1D5}" type="datetimeFigureOut">
               <a:rPr lang="en-NZ" smtClean="0"/>
-              <a:t>20/03/2017</a:t>
+              <a:t>23/03/2017</a:t>
             </a:fld>
             <a:endParaRPr lang="en-NZ"/>
           </a:p>
@@ -764,7 +765,7 @@
           <a:p>
             <a:fld id="{E5B94112-40F8-46F1-9938-B2754288A1D5}" type="datetimeFigureOut">
               <a:rPr lang="en-NZ" smtClean="0"/>
-              <a:t>20/03/2017</a:t>
+              <a:t>23/03/2017</a:t>
             </a:fld>
             <a:endParaRPr lang="en-NZ"/>
           </a:p>
@@ -1010,7 +1011,7 @@
           <a:p>
             <a:fld id="{E5B94112-40F8-46F1-9938-B2754288A1D5}" type="datetimeFigureOut">
               <a:rPr lang="en-NZ" smtClean="0"/>
-              <a:t>20/03/2017</a:t>
+              <a:t>23/03/2017</a:t>
             </a:fld>
             <a:endParaRPr lang="en-NZ"/>
           </a:p>
@@ -1242,7 +1243,7 @@
           <a:p>
             <a:fld id="{E5B94112-40F8-46F1-9938-B2754288A1D5}" type="datetimeFigureOut">
               <a:rPr lang="en-NZ" smtClean="0"/>
-              <a:t>20/03/2017</a:t>
+              <a:t>23/03/2017</a:t>
             </a:fld>
             <a:endParaRPr lang="en-NZ"/>
           </a:p>
@@ -1609,7 +1610,7 @@
           <a:p>
             <a:fld id="{E5B94112-40F8-46F1-9938-B2754288A1D5}" type="datetimeFigureOut">
               <a:rPr lang="en-NZ" smtClean="0"/>
-              <a:t>20/03/2017</a:t>
+              <a:t>23/03/2017</a:t>
             </a:fld>
             <a:endParaRPr lang="en-NZ"/>
           </a:p>
@@ -1727,7 +1728,7 @@
           <a:p>
             <a:fld id="{E5B94112-40F8-46F1-9938-B2754288A1D5}" type="datetimeFigureOut">
               <a:rPr lang="en-NZ" smtClean="0"/>
-              <a:t>20/03/2017</a:t>
+              <a:t>23/03/2017</a:t>
             </a:fld>
             <a:endParaRPr lang="en-NZ"/>
           </a:p>
@@ -1822,7 +1823,7 @@
           <a:p>
             <a:fld id="{E5B94112-40F8-46F1-9938-B2754288A1D5}" type="datetimeFigureOut">
               <a:rPr lang="en-NZ" smtClean="0"/>
-              <a:t>20/03/2017</a:t>
+              <a:t>23/03/2017</a:t>
             </a:fld>
             <a:endParaRPr lang="en-NZ"/>
           </a:p>
@@ -2099,7 +2100,7 @@
           <a:p>
             <a:fld id="{E5B94112-40F8-46F1-9938-B2754288A1D5}" type="datetimeFigureOut">
               <a:rPr lang="en-NZ" smtClean="0"/>
-              <a:t>20/03/2017</a:t>
+              <a:t>23/03/2017</a:t>
             </a:fld>
             <a:endParaRPr lang="en-NZ"/>
           </a:p>
@@ -2352,7 +2353,7 @@
           <a:p>
             <a:fld id="{E5B94112-40F8-46F1-9938-B2754288A1D5}" type="datetimeFigureOut">
               <a:rPr lang="en-NZ" smtClean="0"/>
-              <a:t>20/03/2017</a:t>
+              <a:t>23/03/2017</a:t>
             </a:fld>
             <a:endParaRPr lang="en-NZ"/>
           </a:p>
@@ -2565,7 +2566,7 @@
           <a:p>
             <a:fld id="{E5B94112-40F8-46F1-9938-B2754288A1D5}" type="datetimeFigureOut">
               <a:rPr lang="en-NZ" smtClean="0"/>
-              <a:t>20/03/2017</a:t>
+              <a:t>23/03/2017</a:t>
             </a:fld>
             <a:endParaRPr lang="en-NZ"/>
           </a:p>
@@ -4997,7 +4998,6 @@
               <a:rPr lang="en-NZ" dirty="0"/>
               <a:t>Zoom In and Out of the Map</a:t>
             </a:r>
-            <a:endParaRPr lang="en-NZ" dirty="0"/>
           </a:p>
         </p:txBody>
       </p:sp>
@@ -5183,6 +5183,148 @@
     <p:extLst>
       <p:ext uri="{BB962C8B-B14F-4D97-AF65-F5344CB8AC3E}">
         <p14:creationId xmlns:p14="http://schemas.microsoft.com/office/powerpoint/2010/main" val="1908398647"/>
+      </p:ext>
+    </p:extLst>
+  </p:cSld>
+  <p:clrMapOvr>
+    <a:masterClrMapping/>
+  </p:clrMapOvr>
+</p:sld>
+</file>
+
+<file path=ppt/slides/slide3.xml><?xml version="1.0" encoding="utf-8"?>
+<p:sld xmlns:a="http://schemas.openxmlformats.org/drawingml/2006/main" xmlns:r="http://schemas.openxmlformats.org/officeDocument/2006/relationships" xmlns:p="http://schemas.openxmlformats.org/presentationml/2006/main">
+  <p:cSld>
+    <p:spTree>
+      <p:nvGrpSpPr>
+        <p:cNvPr id="1" name=""/>
+        <p:cNvGrpSpPr/>
+        <p:nvPr/>
+      </p:nvGrpSpPr>
+      <p:grpSpPr>
+        <a:xfrm>
+          <a:off x="0" y="0"/>
+          <a:ext cx="0" cy="0"/>
+          <a:chOff x="0" y="0"/>
+          <a:chExt cx="0" cy="0"/>
+        </a:xfrm>
+      </p:grpSpPr>
+      <p:grpSp>
+        <p:nvGrpSpPr>
+          <p:cNvPr id="10" name="Group 9"/>
+          <p:cNvGrpSpPr/>
+          <p:nvPr/>
+        </p:nvGrpSpPr>
+        <p:grpSpPr>
+          <a:xfrm>
+            <a:off x="550506" y="503853"/>
+            <a:ext cx="10739535" cy="3928188"/>
+            <a:chOff x="550506" y="503853"/>
+            <a:chExt cx="10739535" cy="3928188"/>
+          </a:xfrm>
+        </p:grpSpPr>
+        <p:sp>
+          <p:nvSpPr>
+            <p:cNvPr id="4" name="Rectangle 3"/>
+            <p:cNvSpPr/>
+            <p:nvPr/>
+          </p:nvSpPr>
+          <p:spPr>
+            <a:xfrm>
+              <a:off x="550506" y="503853"/>
+              <a:ext cx="10711543" cy="3928188"/>
+            </a:xfrm>
+            <a:prstGeom prst="rect">
+              <a:avLst/>
+            </a:prstGeom>
+          </p:spPr>
+          <p:style>
+            <a:lnRef idx="2">
+              <a:schemeClr val="dk1"/>
+            </a:lnRef>
+            <a:fillRef idx="1">
+              <a:schemeClr val="lt1"/>
+            </a:fillRef>
+            <a:effectRef idx="0">
+              <a:schemeClr val="dk1"/>
+            </a:effectRef>
+            <a:fontRef idx="minor">
+              <a:schemeClr val="dk1"/>
+            </a:fontRef>
+          </p:style>
+          <p:txBody>
+            <a:bodyPr rtlCol="0" anchor="ctr"/>
+            <a:lstStyle/>
+            <a:p>
+              <a:pPr algn="ctr"/>
+              <a:endParaRPr lang="en-NZ"/>
+            </a:p>
+          </p:txBody>
+        </p:sp>
+        <p:cxnSp>
+          <p:nvCxnSpPr>
+            <p:cNvPr id="9" name="Straight Connector 8"/>
+            <p:cNvCxnSpPr/>
+            <p:nvPr/>
+          </p:nvCxnSpPr>
+          <p:spPr>
+            <a:xfrm>
+              <a:off x="550506" y="849086"/>
+              <a:ext cx="10739535" cy="0"/>
+            </a:xfrm>
+            <a:prstGeom prst="line">
+              <a:avLst/>
+            </a:prstGeom>
+          </p:spPr>
+          <p:style>
+            <a:lnRef idx="1">
+              <a:schemeClr val="dk1"/>
+            </a:lnRef>
+            <a:fillRef idx="0">
+              <a:schemeClr val="dk1"/>
+            </a:fillRef>
+            <a:effectRef idx="0">
+              <a:schemeClr val="dk1"/>
+            </a:effectRef>
+            <a:fontRef idx="minor">
+              <a:schemeClr val="tx1"/>
+            </a:fontRef>
+          </p:style>
+        </p:cxnSp>
+      </p:grpSp>
+      <p:sp>
+        <p:nvSpPr>
+          <p:cNvPr id="2" name="TextBox 1"/>
+          <p:cNvSpPr txBox="1"/>
+          <p:nvPr/>
+        </p:nvSpPr>
+        <p:spPr>
+          <a:xfrm>
+            <a:off x="550506" y="503853"/>
+            <a:ext cx="3722914" cy="369332"/>
+          </a:xfrm>
+          <a:prstGeom prst="rect">
+            <a:avLst/>
+          </a:prstGeom>
+          <a:noFill/>
+        </p:spPr>
+        <p:txBody>
+          <a:bodyPr wrap="square" rtlCol="0">
+            <a:spAutoFit/>
+          </a:bodyPr>
+          <a:lstStyle/>
+          <a:p>
+            <a:r>
+              <a:rPr lang="en-NZ" dirty="0"/>
+              <a:t>Bus Stop Map Subsystem</a:t>
+            </a:r>
+          </a:p>
+        </p:txBody>
+      </p:sp>
+    </p:spTree>
+    <p:extLst>
+      <p:ext uri="{BB962C8B-B14F-4D97-AF65-F5344CB8AC3E}">
+        <p14:creationId xmlns:p14="http://schemas.microsoft.com/office/powerpoint/2010/main" val="3621139051"/>
       </p:ext>
     </p:extLst>
   </p:cSld>

</xml_diff>